<commit_message>
Add debugging, fix workflow diagram
git-svn-id: http://gforge.hl7.org/svn/fhir/trunk/build@13865 2f0db536-2c49-4257-a3fa-e771ed206c19
</commit_message>
<xml_diff>
--- a/images/source/workflow-relations.pptx
+++ b/images/source/workflow-relations.pptx
@@ -112,10 +112,6 @@
 </p:presentation>
 </file>
 
-<file path=ppt/revisionInfo.xml><?xml version="1.0" encoding="utf-8"?>
-<p1510:revInfo xmlns:a="http://schemas.openxmlformats.org/drawingml/2006/main" xmlns:r="http://schemas.openxmlformats.org/officeDocument/2006/relationships" xmlns:p1510="http://schemas.microsoft.com/office/powerpoint/2015/10/main"/>
-</file>
-
 <file path=ppt/slideLayouts/slideLayout1.xml><?xml version="1.0" encoding="utf-8"?>
 <p:sldLayout xmlns:a="http://schemas.openxmlformats.org/drawingml/2006/main" xmlns:r="http://schemas.openxmlformats.org/officeDocument/2006/relationships" xmlns:p="http://schemas.openxmlformats.org/presentationml/2006/main" type="title" preserve="1">
   <p:cSld name="Title Slide">
@@ -247,7 +243,7 @@
           <a:p>
             <a:fld id="{FFDEEC58-532D-4949-8469-8925CAC3C4F6}" type="datetimeFigureOut">
               <a:rPr lang="en-CA" smtClean="0"/>
-              <a:t>2017-11-14</a:t>
+              <a:t>2018-06-18</a:t>
             </a:fld>
             <a:endParaRPr lang="en-CA"/>
           </a:p>
@@ -417,7 +413,7 @@
           <a:p>
             <a:fld id="{FFDEEC58-532D-4949-8469-8925CAC3C4F6}" type="datetimeFigureOut">
               <a:rPr lang="en-CA" smtClean="0"/>
-              <a:t>2017-11-14</a:t>
+              <a:t>2018-06-18</a:t>
             </a:fld>
             <a:endParaRPr lang="en-CA"/>
           </a:p>
@@ -597,7 +593,7 @@
           <a:p>
             <a:fld id="{FFDEEC58-532D-4949-8469-8925CAC3C4F6}" type="datetimeFigureOut">
               <a:rPr lang="en-CA" smtClean="0"/>
-              <a:t>2017-11-14</a:t>
+              <a:t>2018-06-18</a:t>
             </a:fld>
             <a:endParaRPr lang="en-CA"/>
           </a:p>
@@ -767,7 +763,7 @@
           <a:p>
             <a:fld id="{FFDEEC58-532D-4949-8469-8925CAC3C4F6}" type="datetimeFigureOut">
               <a:rPr lang="en-CA" smtClean="0"/>
-              <a:t>2017-11-14</a:t>
+              <a:t>2018-06-18</a:t>
             </a:fld>
             <a:endParaRPr lang="en-CA"/>
           </a:p>
@@ -1011,7 +1007,7 @@
           <a:p>
             <a:fld id="{FFDEEC58-532D-4949-8469-8925CAC3C4F6}" type="datetimeFigureOut">
               <a:rPr lang="en-CA" smtClean="0"/>
-              <a:t>2017-11-14</a:t>
+              <a:t>2018-06-18</a:t>
             </a:fld>
             <a:endParaRPr lang="en-CA"/>
           </a:p>
@@ -1243,7 +1239,7 @@
           <a:p>
             <a:fld id="{FFDEEC58-532D-4949-8469-8925CAC3C4F6}" type="datetimeFigureOut">
               <a:rPr lang="en-CA" smtClean="0"/>
-              <a:t>2017-11-14</a:t>
+              <a:t>2018-06-18</a:t>
             </a:fld>
             <a:endParaRPr lang="en-CA"/>
           </a:p>
@@ -1610,7 +1606,7 @@
           <a:p>
             <a:fld id="{FFDEEC58-532D-4949-8469-8925CAC3C4F6}" type="datetimeFigureOut">
               <a:rPr lang="en-CA" smtClean="0"/>
-              <a:t>2017-11-14</a:t>
+              <a:t>2018-06-18</a:t>
             </a:fld>
             <a:endParaRPr lang="en-CA"/>
           </a:p>
@@ -1728,7 +1724,7 @@
           <a:p>
             <a:fld id="{FFDEEC58-532D-4949-8469-8925CAC3C4F6}" type="datetimeFigureOut">
               <a:rPr lang="en-CA" smtClean="0"/>
-              <a:t>2017-11-14</a:t>
+              <a:t>2018-06-18</a:t>
             </a:fld>
             <a:endParaRPr lang="en-CA"/>
           </a:p>
@@ -1823,7 +1819,7 @@
           <a:p>
             <a:fld id="{FFDEEC58-532D-4949-8469-8925CAC3C4F6}" type="datetimeFigureOut">
               <a:rPr lang="en-CA" smtClean="0"/>
-              <a:t>2017-11-14</a:t>
+              <a:t>2018-06-18</a:t>
             </a:fld>
             <a:endParaRPr lang="en-CA"/>
           </a:p>
@@ -2100,7 +2096,7 @@
           <a:p>
             <a:fld id="{FFDEEC58-532D-4949-8469-8925CAC3C4F6}" type="datetimeFigureOut">
               <a:rPr lang="en-CA" smtClean="0"/>
-              <a:t>2017-11-14</a:t>
+              <a:t>2018-06-18</a:t>
             </a:fld>
             <a:endParaRPr lang="en-CA"/>
           </a:p>
@@ -2357,7 +2353,7 @@
           <a:p>
             <a:fld id="{FFDEEC58-532D-4949-8469-8925CAC3C4F6}" type="datetimeFigureOut">
               <a:rPr lang="en-CA" smtClean="0"/>
-              <a:t>2017-11-14</a:t>
+              <a:t>2018-06-18</a:t>
             </a:fld>
             <a:endParaRPr lang="en-CA"/>
           </a:p>
@@ -2570,7 +2566,7 @@
           <a:p>
             <a:fld id="{FFDEEC58-532D-4949-8469-8925CAC3C4F6}" type="datetimeFigureOut">
               <a:rPr lang="en-CA" smtClean="0"/>
-              <a:t>2017-11-14</a:t>
+              <a:t>2018-06-18</a:t>
             </a:fld>
             <a:endParaRPr lang="en-CA"/>
           </a:p>
@@ -2975,1027 +2971,1087 @@
           <a:chExt cx="0" cy="0"/>
         </a:xfrm>
       </p:grpSpPr>
-      <p:sp>
-        <p:nvSpPr>
-          <p:cNvPr id="108" name="Rectangle 107"/>
-          <p:cNvSpPr/>
+      <p:grpSp>
+        <p:nvGrpSpPr>
+          <p:cNvPr id="2" name="Group 1">
+            <a:extLst>
+              <a:ext uri="{FF2B5EF4-FFF2-40B4-BE49-F238E27FC236}">
+                <a16:creationId xmlns:a16="http://schemas.microsoft.com/office/drawing/2014/main" id="{2ED71A7D-465C-47EB-A567-60C3175EB40C}"/>
+              </a:ext>
+            </a:extLst>
+          </p:cNvPr>
+          <p:cNvGrpSpPr/>
           <p:nvPr/>
-        </p:nvSpPr>
-        <p:spPr>
+        </p:nvGrpSpPr>
+        <p:grpSpPr>
           <a:xfrm>
-            <a:off x="3724534" y="4422251"/>
-            <a:ext cx="926072" cy="414966"/>
+            <a:off x="9295" y="7876"/>
+            <a:ext cx="7397110" cy="5152981"/>
+            <a:chOff x="9295" y="7876"/>
+            <a:chExt cx="7397110" cy="5152981"/>
           </a:xfrm>
-          <a:prstGeom prst="rect">
-            <a:avLst/>
-          </a:prstGeom>
-          <a:noFill/>
-          <a:ln w="25400">
-            <a:solidFill>
-              <a:srgbClr val="5B9BD5"/>
-            </a:solidFill>
-          </a:ln>
-        </p:spPr>
-        <p:style>
-          <a:lnRef idx="2">
-            <a:schemeClr val="accent1">
-              <a:shade val="50000"/>
-            </a:schemeClr>
-          </a:lnRef>
-          <a:fillRef idx="1">
-            <a:schemeClr val="accent1"/>
-          </a:fillRef>
-          <a:effectRef idx="0">
-            <a:schemeClr val="accent1"/>
-          </a:effectRef>
-          <a:fontRef idx="minor">
-            <a:schemeClr val="lt1"/>
-          </a:fontRef>
-        </p:style>
-        <p:txBody>
-          <a:bodyPr rot="0" spcFirstLastPara="0" vertOverflow="overflow" horzOverflow="overflow" vert="horz" wrap="square" lIns="91440" tIns="45721" rIns="91440" bIns="45721" numCol="1" spcCol="0" rtlCol="0" fromWordArt="0" anchor="ctr" anchorCtr="0" forceAA="0" compatLnSpc="1">
-            <a:prstTxWarp prst="textNoShape">
+        </p:grpSpPr>
+        <p:sp>
+          <p:nvSpPr>
+            <p:cNvPr id="108" name="Rectangle 107"/>
+            <p:cNvSpPr/>
+            <p:nvPr/>
+          </p:nvSpPr>
+          <p:spPr>
+            <a:xfrm>
+              <a:off x="3724534" y="4422251"/>
+              <a:ext cx="926072" cy="414966"/>
+            </a:xfrm>
+            <a:prstGeom prst="rect">
               <a:avLst/>
-            </a:prstTxWarp>
-            <a:noAutofit/>
-          </a:bodyPr>
-          <a:lstStyle/>
-          <a:p>
-            <a:pPr algn="ctr"/>
-            <a:endParaRPr lang="en-CA" sz="1801"/>
-          </a:p>
-        </p:txBody>
-      </p:sp>
-      <p:sp>
-        <p:nvSpPr>
-          <p:cNvPr id="99" name="Rectangle 98"/>
-          <p:cNvSpPr/>
-          <p:nvPr/>
-        </p:nvSpPr>
-        <p:spPr>
-          <a:xfrm>
-            <a:off x="1739795" y="333699"/>
-            <a:ext cx="926072" cy="414966"/>
-          </a:xfrm>
-          <a:prstGeom prst="rect">
-            <a:avLst/>
-          </a:prstGeom>
-          <a:noFill/>
-          <a:ln w="25400">
-            <a:solidFill>
-              <a:srgbClr val="5B9BD5"/>
-            </a:solidFill>
-          </a:ln>
-        </p:spPr>
-        <p:style>
-          <a:lnRef idx="2">
-            <a:schemeClr val="accent1">
-              <a:shade val="50000"/>
-            </a:schemeClr>
-          </a:lnRef>
-          <a:fillRef idx="1">
-            <a:schemeClr val="accent1"/>
-          </a:fillRef>
-          <a:effectRef idx="0">
-            <a:schemeClr val="accent1"/>
-          </a:effectRef>
-          <a:fontRef idx="minor">
-            <a:schemeClr val="lt1"/>
-          </a:fontRef>
-        </p:style>
-        <p:txBody>
-          <a:bodyPr rot="0" spcFirstLastPara="0" vertOverflow="overflow" horzOverflow="overflow" vert="horz" wrap="square" lIns="91440" tIns="45721" rIns="91440" bIns="45721" numCol="1" spcCol="0" rtlCol="0" fromWordArt="0" anchor="ctr" anchorCtr="0" forceAA="0" compatLnSpc="1">
-            <a:prstTxWarp prst="textNoShape">
+            </a:prstGeom>
+            <a:noFill/>
+            <a:ln w="25400">
+              <a:solidFill>
+                <a:srgbClr val="5B9BD5"/>
+              </a:solidFill>
+            </a:ln>
+          </p:spPr>
+          <p:style>
+            <a:lnRef idx="2">
+              <a:schemeClr val="accent1">
+                <a:shade val="50000"/>
+              </a:schemeClr>
+            </a:lnRef>
+            <a:fillRef idx="1">
+              <a:schemeClr val="accent1"/>
+            </a:fillRef>
+            <a:effectRef idx="0">
+              <a:schemeClr val="accent1"/>
+            </a:effectRef>
+            <a:fontRef idx="minor">
+              <a:schemeClr val="lt1"/>
+            </a:fontRef>
+          </p:style>
+          <p:txBody>
+            <a:bodyPr rot="0" spcFirstLastPara="0" vertOverflow="overflow" horzOverflow="overflow" vert="horz" wrap="square" lIns="91440" tIns="45721" rIns="91440" bIns="45721" numCol="1" spcCol="0" rtlCol="0" fromWordArt="0" anchor="ctr" anchorCtr="0" forceAA="0" compatLnSpc="1">
+              <a:prstTxWarp prst="textNoShape">
+                <a:avLst/>
+              </a:prstTxWarp>
+              <a:noAutofit/>
+            </a:bodyPr>
+            <a:lstStyle/>
+            <a:p>
+              <a:pPr algn="ctr"/>
+              <a:endParaRPr lang="en-CA" sz="1801"/>
+            </a:p>
+          </p:txBody>
+        </p:sp>
+        <p:sp>
+          <p:nvSpPr>
+            <p:cNvPr id="99" name="Rectangle 98"/>
+            <p:cNvSpPr/>
+            <p:nvPr/>
+          </p:nvSpPr>
+          <p:spPr>
+            <a:xfrm>
+              <a:off x="1739795" y="333699"/>
+              <a:ext cx="926072" cy="414966"/>
+            </a:xfrm>
+            <a:prstGeom prst="rect">
               <a:avLst/>
-            </a:prstTxWarp>
-            <a:noAutofit/>
-          </a:bodyPr>
-          <a:lstStyle/>
-          <a:p>
-            <a:pPr algn="ctr"/>
-            <a:endParaRPr lang="en-CA" sz="1801"/>
-          </a:p>
-        </p:txBody>
-      </p:sp>
-      <p:sp>
-        <p:nvSpPr>
-          <p:cNvPr id="96" name="Rectangle 95"/>
-          <p:cNvSpPr/>
-          <p:nvPr/>
-        </p:nvSpPr>
-        <p:spPr>
-          <a:xfrm>
-            <a:off x="410939" y="1168060"/>
-            <a:ext cx="565850" cy="476749"/>
-          </a:xfrm>
-          <a:prstGeom prst="rect">
-            <a:avLst/>
-          </a:prstGeom>
-          <a:noFill/>
-          <a:ln w="25400">
-            <a:solidFill>
-              <a:srgbClr val="5B9BD5"/>
-            </a:solidFill>
-          </a:ln>
-        </p:spPr>
-        <p:style>
-          <a:lnRef idx="2">
-            <a:schemeClr val="accent1">
-              <a:shade val="50000"/>
-            </a:schemeClr>
-          </a:lnRef>
-          <a:fillRef idx="1">
-            <a:schemeClr val="accent1"/>
-          </a:fillRef>
-          <a:effectRef idx="0">
-            <a:schemeClr val="accent1"/>
-          </a:effectRef>
-          <a:fontRef idx="minor">
-            <a:schemeClr val="lt1"/>
-          </a:fontRef>
-        </p:style>
-        <p:txBody>
-          <a:bodyPr rot="0" spcFirstLastPara="0" vertOverflow="overflow" horzOverflow="overflow" vert="horz" wrap="square" lIns="91440" tIns="45721" rIns="91440" bIns="45721" numCol="1" spcCol="0" rtlCol="0" fromWordArt="0" anchor="ctr" anchorCtr="0" forceAA="0" compatLnSpc="1">
-            <a:prstTxWarp prst="textNoShape">
+            </a:prstGeom>
+            <a:noFill/>
+            <a:ln w="25400">
+              <a:solidFill>
+                <a:srgbClr val="5B9BD5"/>
+              </a:solidFill>
+            </a:ln>
+          </p:spPr>
+          <p:style>
+            <a:lnRef idx="2">
+              <a:schemeClr val="accent1">
+                <a:shade val="50000"/>
+              </a:schemeClr>
+            </a:lnRef>
+            <a:fillRef idx="1">
+              <a:schemeClr val="accent1"/>
+            </a:fillRef>
+            <a:effectRef idx="0">
+              <a:schemeClr val="accent1"/>
+            </a:effectRef>
+            <a:fontRef idx="minor">
+              <a:schemeClr val="lt1"/>
+            </a:fontRef>
+          </p:style>
+          <p:txBody>
+            <a:bodyPr rot="0" spcFirstLastPara="0" vertOverflow="overflow" horzOverflow="overflow" vert="horz" wrap="square" lIns="91440" tIns="45721" rIns="91440" bIns="45721" numCol="1" spcCol="0" rtlCol="0" fromWordArt="0" anchor="ctr" anchorCtr="0" forceAA="0" compatLnSpc="1">
+              <a:prstTxWarp prst="textNoShape">
+                <a:avLst/>
+              </a:prstTxWarp>
+              <a:noAutofit/>
+            </a:bodyPr>
+            <a:lstStyle/>
+            <a:p>
+              <a:pPr algn="ctr"/>
+              <a:endParaRPr lang="en-CA" sz="1801"/>
+            </a:p>
+          </p:txBody>
+        </p:sp>
+        <p:sp>
+          <p:nvSpPr>
+            <p:cNvPr id="96" name="Rectangle 95"/>
+            <p:cNvSpPr/>
+            <p:nvPr/>
+          </p:nvSpPr>
+          <p:spPr>
+            <a:xfrm>
+              <a:off x="410939" y="1168060"/>
+              <a:ext cx="565850" cy="476749"/>
+            </a:xfrm>
+            <a:prstGeom prst="rect">
               <a:avLst/>
-            </a:prstTxWarp>
-            <a:noAutofit/>
-          </a:bodyPr>
-          <a:lstStyle/>
-          <a:p>
-            <a:pPr algn="ctr"/>
-            <a:endParaRPr lang="en-CA" sz="1801"/>
-          </a:p>
-        </p:txBody>
-      </p:sp>
-      <p:sp>
-        <p:nvSpPr>
-          <p:cNvPr id="105" name="Rectangle 104"/>
-          <p:cNvSpPr/>
-          <p:nvPr/>
-        </p:nvSpPr>
-        <p:spPr>
-          <a:xfrm>
-            <a:off x="5745099" y="333699"/>
-            <a:ext cx="926072" cy="414966"/>
-          </a:xfrm>
-          <a:prstGeom prst="rect">
-            <a:avLst/>
-          </a:prstGeom>
-          <a:noFill/>
-          <a:ln w="25400">
-            <a:solidFill>
-              <a:srgbClr val="5B9BD5"/>
-            </a:solidFill>
-          </a:ln>
-        </p:spPr>
-        <p:style>
-          <a:lnRef idx="2">
-            <a:schemeClr val="accent1">
-              <a:shade val="50000"/>
-            </a:schemeClr>
-          </a:lnRef>
-          <a:fillRef idx="1">
-            <a:schemeClr val="accent1"/>
-          </a:fillRef>
-          <a:effectRef idx="0">
-            <a:schemeClr val="accent1"/>
-          </a:effectRef>
-          <a:fontRef idx="minor">
-            <a:schemeClr val="lt1"/>
-          </a:fontRef>
-        </p:style>
-        <p:txBody>
-          <a:bodyPr rot="0" spcFirstLastPara="0" vertOverflow="overflow" horzOverflow="overflow" vert="horz" wrap="square" lIns="91440" tIns="45721" rIns="91440" bIns="45721" numCol="1" spcCol="0" rtlCol="0" fromWordArt="0" anchor="ctr" anchorCtr="0" forceAA="0" compatLnSpc="1">
-            <a:prstTxWarp prst="textNoShape">
+            </a:prstGeom>
+            <a:noFill/>
+            <a:ln w="25400">
+              <a:solidFill>
+                <a:srgbClr val="5B9BD5"/>
+              </a:solidFill>
+            </a:ln>
+          </p:spPr>
+          <p:style>
+            <a:lnRef idx="2">
+              <a:schemeClr val="accent1">
+                <a:shade val="50000"/>
+              </a:schemeClr>
+            </a:lnRef>
+            <a:fillRef idx="1">
+              <a:schemeClr val="accent1"/>
+            </a:fillRef>
+            <a:effectRef idx="0">
+              <a:schemeClr val="accent1"/>
+            </a:effectRef>
+            <a:fontRef idx="minor">
+              <a:schemeClr val="lt1"/>
+            </a:fontRef>
+          </p:style>
+          <p:txBody>
+            <a:bodyPr rot="0" spcFirstLastPara="0" vertOverflow="overflow" horzOverflow="overflow" vert="horz" wrap="square" lIns="91440" tIns="45721" rIns="91440" bIns="45721" numCol="1" spcCol="0" rtlCol="0" fromWordArt="0" anchor="ctr" anchorCtr="0" forceAA="0" compatLnSpc="1">
+              <a:prstTxWarp prst="textNoShape">
+                <a:avLst/>
+              </a:prstTxWarp>
+              <a:noAutofit/>
+            </a:bodyPr>
+            <a:lstStyle/>
+            <a:p>
+              <a:pPr algn="ctr"/>
+              <a:endParaRPr lang="en-CA" sz="1801"/>
+            </a:p>
+          </p:txBody>
+        </p:sp>
+        <p:sp>
+          <p:nvSpPr>
+            <p:cNvPr id="105" name="Rectangle 104"/>
+            <p:cNvSpPr/>
+            <p:nvPr/>
+          </p:nvSpPr>
+          <p:spPr>
+            <a:xfrm>
+              <a:off x="5745099" y="333699"/>
+              <a:ext cx="926072" cy="414966"/>
+            </a:xfrm>
+            <a:prstGeom prst="rect">
               <a:avLst/>
-            </a:prstTxWarp>
-            <a:noAutofit/>
-          </a:bodyPr>
-          <a:lstStyle/>
-          <a:p>
-            <a:pPr algn="ctr"/>
-            <a:endParaRPr lang="en-CA" sz="1801"/>
-          </a:p>
-        </p:txBody>
-      </p:sp>
-      <p:sp>
-        <p:nvSpPr>
-          <p:cNvPr id="4" name="Rectangle: Rounded Corners 3"/>
-          <p:cNvSpPr/>
-          <p:nvPr/>
-        </p:nvSpPr>
-        <p:spPr>
-          <a:xfrm>
-            <a:off x="970901" y="716477"/>
-            <a:ext cx="2493818" cy="1379912"/>
-          </a:xfrm>
-          <a:prstGeom prst="roundRect">
-            <a:avLst/>
-          </a:prstGeom>
-        </p:spPr>
-        <p:style>
-          <a:lnRef idx="2">
-            <a:schemeClr val="accent1">
-              <a:shade val="50000"/>
-            </a:schemeClr>
-          </a:lnRef>
-          <a:fillRef idx="1">
-            <a:schemeClr val="accent1"/>
-          </a:fillRef>
-          <a:effectRef idx="0">
-            <a:schemeClr val="accent1"/>
-          </a:effectRef>
-          <a:fontRef idx="minor">
-            <a:schemeClr val="lt1"/>
-          </a:fontRef>
-        </p:style>
-        <p:txBody>
-          <a:bodyPr rot="0" spcFirstLastPara="0" vertOverflow="overflow" horzOverflow="overflow" vert="horz" wrap="square" lIns="91440" tIns="45721" rIns="91440" bIns="45721" numCol="1" spcCol="0" rtlCol="0" fromWordArt="0" anchor="ctr" anchorCtr="0" forceAA="0" compatLnSpc="1">
-            <a:prstTxWarp prst="textNoShape">
+            </a:prstGeom>
+            <a:noFill/>
+            <a:ln w="25400">
+              <a:solidFill>
+                <a:srgbClr val="5B9BD5"/>
+              </a:solidFill>
+            </a:ln>
+          </p:spPr>
+          <p:style>
+            <a:lnRef idx="2">
+              <a:schemeClr val="accent1">
+                <a:shade val="50000"/>
+              </a:schemeClr>
+            </a:lnRef>
+            <a:fillRef idx="1">
+              <a:schemeClr val="accent1"/>
+            </a:fillRef>
+            <a:effectRef idx="0">
+              <a:schemeClr val="accent1"/>
+            </a:effectRef>
+            <a:fontRef idx="minor">
+              <a:schemeClr val="lt1"/>
+            </a:fontRef>
+          </p:style>
+          <p:txBody>
+            <a:bodyPr rot="0" spcFirstLastPara="0" vertOverflow="overflow" horzOverflow="overflow" vert="horz" wrap="square" lIns="91440" tIns="45721" rIns="91440" bIns="45721" numCol="1" spcCol="0" rtlCol="0" fromWordArt="0" anchor="ctr" anchorCtr="0" forceAA="0" compatLnSpc="1">
+              <a:prstTxWarp prst="textNoShape">
+                <a:avLst/>
+              </a:prstTxWarp>
+              <a:noAutofit/>
+            </a:bodyPr>
+            <a:lstStyle/>
+            <a:p>
+              <a:pPr algn="ctr"/>
+              <a:endParaRPr lang="en-CA" sz="1801"/>
+            </a:p>
+          </p:txBody>
+        </p:sp>
+        <p:sp>
+          <p:nvSpPr>
+            <p:cNvPr id="4" name="Rectangle: Rounded Corners 3"/>
+            <p:cNvSpPr/>
+            <p:nvPr/>
+          </p:nvSpPr>
+          <p:spPr>
+            <a:xfrm>
+              <a:off x="970901" y="716477"/>
+              <a:ext cx="2493818" cy="1379912"/>
+            </a:xfrm>
+            <a:prstGeom prst="roundRect">
               <a:avLst/>
-            </a:prstTxWarp>
-            <a:noAutofit/>
-          </a:bodyPr>
-          <a:lstStyle/>
-          <a:p>
-            <a:pPr algn="ctr"/>
-            <a:r>
-              <a:rPr lang="en-CA" sz="3200" b="1" dirty="0"/>
-              <a:t>Request</a:t>
-            </a:r>
-          </a:p>
-        </p:txBody>
-      </p:sp>
-      <p:cxnSp>
-        <p:nvCxnSpPr>
-          <p:cNvPr id="8" name="Connector: Elbow 7"/>
-          <p:cNvCxnSpPr>
-            <a:stCxn id="4" idx="2"/>
-            <a:endCxn id="5" idx="1"/>
-          </p:cNvCxnSpPr>
-          <p:nvPr/>
-        </p:nvCxnSpPr>
-        <p:spPr>
-          <a:xfrm rot="16200000" flipH="1">
-            <a:off x="1741583" y="2572622"/>
-            <a:ext cx="1676395" cy="723933"/>
-          </a:xfrm>
-          <a:prstGeom prst="bentConnector2">
-            <a:avLst/>
-          </a:prstGeom>
-          <a:ln w="25400">
-            <a:tailEnd type="triangle" w="lg" len="lg"/>
-          </a:ln>
-        </p:spPr>
-        <p:style>
-          <a:lnRef idx="1">
-            <a:schemeClr val="accent1"/>
-          </a:lnRef>
-          <a:fillRef idx="0">
-            <a:schemeClr val="accent1"/>
-          </a:fillRef>
-          <a:effectRef idx="0">
-            <a:schemeClr val="accent1"/>
-          </a:effectRef>
-          <a:fontRef idx="minor">
-            <a:schemeClr val="tx1"/>
-          </a:fontRef>
-        </p:style>
-      </p:cxnSp>
-      <p:sp>
-        <p:nvSpPr>
-          <p:cNvPr id="14" name="TextBox 13"/>
-          <p:cNvSpPr txBox="1"/>
-          <p:nvPr/>
-        </p:nvSpPr>
-        <p:spPr>
-          <a:xfrm>
-            <a:off x="3679542" y="1074670"/>
-            <a:ext cx="1018227" cy="369460"/>
-          </a:xfrm>
-          <a:prstGeom prst="rect">
-            <a:avLst/>
-          </a:prstGeom>
-          <a:noFill/>
-        </p:spPr>
-        <p:txBody>
-          <a:bodyPr wrap="none" rtlCol="0">
-            <a:spAutoFit/>
-          </a:bodyPr>
-          <a:lstStyle/>
-          <a:p>
-            <a:r>
-              <a:rPr lang="en-CA" sz="1801" dirty="0" err="1"/>
-              <a:t>basedOn</a:t>
-            </a:r>
-            <a:endParaRPr lang="en-CA" sz="1801" dirty="0"/>
-          </a:p>
-        </p:txBody>
-      </p:sp>
-      <p:sp>
-        <p:nvSpPr>
-          <p:cNvPr id="15" name="TextBox 14"/>
-          <p:cNvSpPr txBox="1"/>
-          <p:nvPr/>
-        </p:nvSpPr>
-        <p:spPr>
-          <a:xfrm>
-            <a:off x="5509725" y="3757052"/>
-            <a:ext cx="1269002" cy="369460"/>
-          </a:xfrm>
-          <a:prstGeom prst="rect">
-            <a:avLst/>
-          </a:prstGeom>
-          <a:noFill/>
-        </p:spPr>
-        <p:txBody>
-          <a:bodyPr wrap="none" rtlCol="0">
-            <a:spAutoFit/>
-          </a:bodyPr>
-          <a:lstStyle/>
-          <a:p>
-            <a:r>
-              <a:rPr lang="en-CA" sz="1801" dirty="0"/>
-              <a:t>instantiates</a:t>
-            </a:r>
-          </a:p>
-        </p:txBody>
-      </p:sp>
-      <p:sp>
-        <p:nvSpPr>
-          <p:cNvPr id="18" name="TextBox 17"/>
-          <p:cNvSpPr txBox="1"/>
-          <p:nvPr/>
-        </p:nvSpPr>
-        <p:spPr>
-          <a:xfrm>
-            <a:off x="5804983" y="7876"/>
-            <a:ext cx="797013" cy="369460"/>
-          </a:xfrm>
-          <a:prstGeom prst="rect">
-            <a:avLst/>
-          </a:prstGeom>
-          <a:noFill/>
-        </p:spPr>
-        <p:txBody>
-          <a:bodyPr wrap="none" rtlCol="0">
-            <a:spAutoFit/>
-          </a:bodyPr>
-          <a:lstStyle/>
-          <a:p>
-            <a:r>
-              <a:rPr lang="en-CA" sz="1801" dirty="0" err="1"/>
-              <a:t>partOf</a:t>
-            </a:r>
-            <a:endParaRPr lang="en-CA" sz="1801" dirty="0"/>
-          </a:p>
-        </p:txBody>
-      </p:sp>
-      <p:sp>
-        <p:nvSpPr>
-          <p:cNvPr id="19" name="TextBox 18"/>
-          <p:cNvSpPr txBox="1"/>
-          <p:nvPr/>
-        </p:nvSpPr>
-        <p:spPr>
-          <a:xfrm>
-            <a:off x="9295" y="852684"/>
-            <a:ext cx="1018227" cy="369460"/>
-          </a:xfrm>
-          <a:prstGeom prst="rect">
-            <a:avLst/>
-          </a:prstGeom>
-          <a:noFill/>
-        </p:spPr>
-        <p:txBody>
-          <a:bodyPr wrap="none" rtlCol="0">
-            <a:spAutoFit/>
-          </a:bodyPr>
-          <a:lstStyle/>
-          <a:p>
-            <a:r>
-              <a:rPr lang="en-CA" sz="1801" dirty="0" err="1"/>
-              <a:t>basedOn</a:t>
-            </a:r>
-            <a:endParaRPr lang="en-CA" sz="1801" dirty="0"/>
-          </a:p>
-        </p:txBody>
-      </p:sp>
-      <p:sp>
-        <p:nvSpPr>
-          <p:cNvPr id="20" name="TextBox 19"/>
-          <p:cNvSpPr txBox="1"/>
-          <p:nvPr/>
-        </p:nvSpPr>
-        <p:spPr>
-          <a:xfrm>
-            <a:off x="1668690" y="3757052"/>
-            <a:ext cx="1269002" cy="369460"/>
-          </a:xfrm>
-          <a:prstGeom prst="rect">
-            <a:avLst/>
-          </a:prstGeom>
-          <a:noFill/>
-        </p:spPr>
-        <p:txBody>
-          <a:bodyPr wrap="none" rtlCol="0">
-            <a:spAutoFit/>
-          </a:bodyPr>
-          <a:lstStyle/>
-          <a:p>
-            <a:r>
-              <a:rPr lang="en-CA" sz="1801" dirty="0"/>
-              <a:t>instantiates</a:t>
-            </a:r>
-          </a:p>
-        </p:txBody>
-      </p:sp>
-      <p:sp>
-        <p:nvSpPr>
-          <p:cNvPr id="21" name="TextBox 20"/>
-          <p:cNvSpPr txBox="1"/>
-          <p:nvPr/>
-        </p:nvSpPr>
-        <p:spPr>
-          <a:xfrm>
-            <a:off x="1721155" y="9480"/>
-            <a:ext cx="965521" cy="369460"/>
-          </a:xfrm>
-          <a:prstGeom prst="rect">
-            <a:avLst/>
-          </a:prstGeom>
-          <a:noFill/>
-        </p:spPr>
-        <p:txBody>
-          <a:bodyPr wrap="none" rtlCol="0">
-            <a:spAutoFit/>
-          </a:bodyPr>
-          <a:lstStyle/>
-          <a:p>
-            <a:r>
-              <a:rPr lang="en-CA" sz="1801" dirty="0"/>
-              <a:t>replaces</a:t>
-            </a:r>
-          </a:p>
-        </p:txBody>
-      </p:sp>
-      <p:sp>
-        <p:nvSpPr>
-          <p:cNvPr id="22" name="TextBox 21"/>
-          <p:cNvSpPr txBox="1"/>
-          <p:nvPr/>
-        </p:nvSpPr>
-        <p:spPr>
-          <a:xfrm>
-            <a:off x="3641811" y="4791397"/>
-            <a:ext cx="1091517" cy="369460"/>
-          </a:xfrm>
-          <a:prstGeom prst="rect">
-            <a:avLst/>
-          </a:prstGeom>
-          <a:noFill/>
-        </p:spPr>
-        <p:txBody>
-          <a:bodyPr wrap="none" rtlCol="0">
-            <a:spAutoFit/>
-          </a:bodyPr>
-          <a:lstStyle/>
-          <a:p>
-            <a:r>
-              <a:rPr lang="en-CA" sz="1801" dirty="0"/>
-              <a:t>definition</a:t>
-            </a:r>
-          </a:p>
-        </p:txBody>
-      </p:sp>
-      <p:sp>
-        <p:nvSpPr>
-          <p:cNvPr id="23" name="TextBox 22"/>
-          <p:cNvSpPr txBox="1"/>
-          <p:nvPr/>
-        </p:nvSpPr>
-        <p:spPr>
-          <a:xfrm>
-            <a:off x="3208284" y="2384709"/>
-            <a:ext cx="797013" cy="369460"/>
-          </a:xfrm>
-          <a:prstGeom prst="rect">
-            <a:avLst/>
-          </a:prstGeom>
-          <a:noFill/>
-        </p:spPr>
-        <p:txBody>
-          <a:bodyPr wrap="none" rtlCol="0">
-            <a:spAutoFit/>
-          </a:bodyPr>
-          <a:lstStyle/>
-          <a:p>
-            <a:r>
-              <a:rPr lang="en-CA" sz="1801" dirty="0" err="1"/>
-              <a:t>partOf</a:t>
-            </a:r>
-            <a:endParaRPr lang="en-CA" sz="1801" dirty="0"/>
-          </a:p>
-        </p:txBody>
-      </p:sp>
-      <p:cxnSp>
-        <p:nvCxnSpPr>
-          <p:cNvPr id="32" name="Connector: Elbow 31"/>
-          <p:cNvCxnSpPr>
-            <a:endCxn id="4" idx="3"/>
-          </p:cNvCxnSpPr>
-          <p:nvPr/>
-        </p:nvCxnSpPr>
-        <p:spPr>
-          <a:xfrm rot="10800000">
-            <a:off x="3464723" y="1406435"/>
-            <a:ext cx="1917035" cy="2971"/>
-          </a:xfrm>
-          <a:prstGeom prst="bentConnector3">
-            <a:avLst>
-              <a:gd name="adj1" fmla="val 50000"/>
-            </a:avLst>
-          </a:prstGeom>
-          <a:ln w="25400">
-            <a:tailEnd type="triangle" w="lg" len="lg"/>
-          </a:ln>
-        </p:spPr>
-        <p:style>
-          <a:lnRef idx="1">
-            <a:schemeClr val="accent1"/>
-          </a:lnRef>
-          <a:fillRef idx="0">
-            <a:schemeClr val="accent1"/>
-          </a:fillRef>
-          <a:effectRef idx="0">
-            <a:schemeClr val="accent1"/>
-          </a:effectRef>
-          <a:fontRef idx="minor">
-            <a:schemeClr val="tx1"/>
-          </a:fontRef>
-        </p:style>
-      </p:cxnSp>
-      <p:sp>
-        <p:nvSpPr>
-          <p:cNvPr id="37" name="Rectangle: Rounded Corners 36"/>
-          <p:cNvSpPr/>
-          <p:nvPr/>
-        </p:nvSpPr>
-        <p:spPr>
-          <a:xfrm>
-            <a:off x="4912587" y="716477"/>
-            <a:ext cx="2493818" cy="1379912"/>
-          </a:xfrm>
-          <a:prstGeom prst="roundRect">
-            <a:avLst/>
-          </a:prstGeom>
-        </p:spPr>
-        <p:style>
-          <a:lnRef idx="2">
-            <a:schemeClr val="accent1">
-              <a:shade val="50000"/>
-            </a:schemeClr>
-          </a:lnRef>
-          <a:fillRef idx="1">
-            <a:schemeClr val="accent1"/>
-          </a:fillRef>
-          <a:effectRef idx="0">
-            <a:schemeClr val="accent1"/>
-          </a:effectRef>
-          <a:fontRef idx="minor">
-            <a:schemeClr val="lt1"/>
-          </a:fontRef>
-        </p:style>
-        <p:txBody>
-          <a:bodyPr rot="0" spcFirstLastPara="0" vertOverflow="overflow" horzOverflow="overflow" vert="horz" wrap="square" lIns="91440" tIns="45721" rIns="91440" bIns="45721" numCol="1" spcCol="0" rtlCol="0" fromWordArt="0" anchor="ctr" anchorCtr="0" forceAA="0" compatLnSpc="1">
-            <a:prstTxWarp prst="textNoShape">
+            </a:prstGeom>
+          </p:spPr>
+          <p:style>
+            <a:lnRef idx="2">
+              <a:schemeClr val="accent1">
+                <a:shade val="50000"/>
+              </a:schemeClr>
+            </a:lnRef>
+            <a:fillRef idx="1">
+              <a:schemeClr val="accent1"/>
+            </a:fillRef>
+            <a:effectRef idx="0">
+              <a:schemeClr val="accent1"/>
+            </a:effectRef>
+            <a:fontRef idx="minor">
+              <a:schemeClr val="lt1"/>
+            </a:fontRef>
+          </p:style>
+          <p:txBody>
+            <a:bodyPr rot="0" spcFirstLastPara="0" vertOverflow="overflow" horzOverflow="overflow" vert="horz" wrap="square" lIns="91440" tIns="45721" rIns="91440" bIns="45721" numCol="1" spcCol="0" rtlCol="0" fromWordArt="0" anchor="ctr" anchorCtr="0" forceAA="0" compatLnSpc="1">
+              <a:prstTxWarp prst="textNoShape">
+                <a:avLst/>
+              </a:prstTxWarp>
+              <a:noAutofit/>
+            </a:bodyPr>
+            <a:lstStyle/>
+            <a:p>
+              <a:pPr algn="ctr"/>
+              <a:r>
+                <a:rPr lang="en-CA" sz="3200" b="1" dirty="0"/>
+                <a:t>Request</a:t>
+              </a:r>
+            </a:p>
+          </p:txBody>
+        </p:sp>
+        <p:cxnSp>
+          <p:nvCxnSpPr>
+            <p:cNvPr id="8" name="Connector: Elbow 7"/>
+            <p:cNvCxnSpPr>
+              <a:stCxn id="4" idx="2"/>
+              <a:endCxn id="5" idx="1"/>
+            </p:cNvCxnSpPr>
+            <p:nvPr/>
+          </p:nvCxnSpPr>
+          <p:spPr>
+            <a:xfrm rot="16200000" flipH="1">
+              <a:off x="1741583" y="2572622"/>
+              <a:ext cx="1676395" cy="723933"/>
+            </a:xfrm>
+            <a:prstGeom prst="bentConnector2">
               <a:avLst/>
-            </a:prstTxWarp>
-            <a:noAutofit/>
-          </a:bodyPr>
-          <a:lstStyle/>
-          <a:p>
-            <a:pPr algn="ctr"/>
-            <a:r>
-              <a:rPr lang="en-CA" sz="3200" b="1" dirty="0"/>
-              <a:t>Event</a:t>
-            </a:r>
-          </a:p>
-        </p:txBody>
-      </p:sp>
-      <p:cxnSp>
-        <p:nvCxnSpPr>
-          <p:cNvPr id="40" name="Connector: Elbow 39"/>
-          <p:cNvCxnSpPr>
-            <a:stCxn id="37" idx="2"/>
-            <a:endCxn id="5" idx="3"/>
-          </p:cNvCxnSpPr>
-          <p:nvPr/>
-        </p:nvCxnSpPr>
-        <p:spPr>
-          <a:xfrm rot="5400000">
-            <a:off x="4959335" y="2572621"/>
-            <a:ext cx="1676395" cy="723935"/>
-          </a:xfrm>
-          <a:prstGeom prst="bentConnector2">
-            <a:avLst/>
-          </a:prstGeom>
-          <a:ln w="25400">
-            <a:tailEnd type="triangle" w="lg" len="lg"/>
-          </a:ln>
-        </p:spPr>
-        <p:style>
-          <a:lnRef idx="1">
-            <a:schemeClr val="accent1"/>
-          </a:lnRef>
-          <a:fillRef idx="0">
-            <a:schemeClr val="accent1"/>
-          </a:fillRef>
-          <a:effectRef idx="0">
-            <a:schemeClr val="accent1"/>
-          </a:effectRef>
-          <a:fontRef idx="minor">
-            <a:schemeClr val="tx1"/>
-          </a:fontRef>
-        </p:style>
-      </p:cxnSp>
-      <p:cxnSp>
-        <p:nvCxnSpPr>
-          <p:cNvPr id="66" name="Straight Connector 65"/>
-          <p:cNvCxnSpPr/>
-          <p:nvPr/>
-        </p:nvCxnSpPr>
-        <p:spPr>
-          <a:xfrm>
-            <a:off x="3724534" y="4468120"/>
-            <a:ext cx="0" cy="376575"/>
-          </a:xfrm>
-          <a:prstGeom prst="line">
-            <a:avLst/>
-          </a:prstGeom>
-          <a:ln w="25400"/>
-        </p:spPr>
-        <p:style>
-          <a:lnRef idx="1">
-            <a:schemeClr val="accent1"/>
-          </a:lnRef>
-          <a:fillRef idx="0">
-            <a:schemeClr val="accent1"/>
-          </a:fillRef>
-          <a:effectRef idx="0">
-            <a:schemeClr val="accent1"/>
-          </a:effectRef>
-          <a:fontRef idx="minor">
-            <a:schemeClr val="tx1"/>
-          </a:fontRef>
-        </p:style>
-      </p:cxnSp>
-      <p:sp>
-        <p:nvSpPr>
-          <p:cNvPr id="102" name="Rectangle 101"/>
-          <p:cNvSpPr/>
-          <p:nvPr/>
-        </p:nvSpPr>
-        <p:spPr>
-          <a:xfrm>
-            <a:off x="3143755" y="2683826"/>
-            <a:ext cx="926072" cy="414966"/>
-          </a:xfrm>
-          <a:prstGeom prst="rect">
-            <a:avLst/>
-          </a:prstGeom>
-          <a:noFill/>
-          <a:ln w="25400">
-            <a:solidFill>
-              <a:srgbClr val="5B9BD5"/>
-            </a:solidFill>
-          </a:ln>
-        </p:spPr>
-        <p:style>
-          <a:lnRef idx="2">
-            <a:schemeClr val="accent1">
-              <a:shade val="50000"/>
-            </a:schemeClr>
-          </a:lnRef>
-          <a:fillRef idx="1">
-            <a:schemeClr val="accent1"/>
-          </a:fillRef>
-          <a:effectRef idx="0">
-            <a:schemeClr val="accent1"/>
-          </a:effectRef>
-          <a:fontRef idx="minor">
-            <a:schemeClr val="lt1"/>
-          </a:fontRef>
-        </p:style>
-        <p:txBody>
-          <a:bodyPr rot="0" spcFirstLastPara="0" vertOverflow="overflow" horzOverflow="overflow" vert="horz" wrap="square" lIns="91440" tIns="45721" rIns="91440" bIns="45721" numCol="1" spcCol="0" rtlCol="0" fromWordArt="0" anchor="ctr" anchorCtr="0" forceAA="0" compatLnSpc="1">
-            <a:prstTxWarp prst="textNoShape">
+            </a:prstGeom>
+            <a:ln w="25400">
+              <a:tailEnd type="triangle" w="lg" len="lg"/>
+            </a:ln>
+          </p:spPr>
+          <p:style>
+            <a:lnRef idx="1">
+              <a:schemeClr val="accent1"/>
+            </a:lnRef>
+            <a:fillRef idx="0">
+              <a:schemeClr val="accent1"/>
+            </a:fillRef>
+            <a:effectRef idx="0">
+              <a:schemeClr val="accent1"/>
+            </a:effectRef>
+            <a:fontRef idx="minor">
+              <a:schemeClr val="tx1"/>
+            </a:fontRef>
+          </p:style>
+        </p:cxnSp>
+        <p:sp>
+          <p:nvSpPr>
+            <p:cNvPr id="14" name="TextBox 13"/>
+            <p:cNvSpPr txBox="1"/>
+            <p:nvPr/>
+          </p:nvSpPr>
+          <p:spPr>
+            <a:xfrm>
+              <a:off x="3679542" y="1074670"/>
+              <a:ext cx="1018227" cy="369460"/>
+            </a:xfrm>
+            <a:prstGeom prst="rect">
               <a:avLst/>
-            </a:prstTxWarp>
-            <a:noAutofit/>
-          </a:bodyPr>
-          <a:lstStyle/>
-          <a:p>
-            <a:pPr algn="ctr"/>
-            <a:endParaRPr lang="en-CA" sz="1801"/>
-          </a:p>
-        </p:txBody>
-      </p:sp>
-      <p:sp>
-        <p:nvSpPr>
-          <p:cNvPr id="5" name="Rectangle: Rounded Corners 4"/>
-          <p:cNvSpPr/>
-          <p:nvPr/>
-        </p:nvSpPr>
-        <p:spPr>
-          <a:xfrm>
-            <a:off x="2941743" y="3082827"/>
-            <a:ext cx="2493818" cy="1379912"/>
-          </a:xfrm>
-          <a:prstGeom prst="roundRect">
-            <a:avLst/>
-          </a:prstGeom>
-        </p:spPr>
-        <p:style>
-          <a:lnRef idx="2">
-            <a:schemeClr val="accent1">
-              <a:shade val="50000"/>
-            </a:schemeClr>
-          </a:lnRef>
-          <a:fillRef idx="1">
-            <a:schemeClr val="accent1"/>
-          </a:fillRef>
-          <a:effectRef idx="0">
-            <a:schemeClr val="accent1"/>
-          </a:effectRef>
-          <a:fontRef idx="minor">
-            <a:schemeClr val="lt1"/>
-          </a:fontRef>
-        </p:style>
-        <p:txBody>
-          <a:bodyPr rot="0" spcFirstLastPara="0" vertOverflow="overflow" horzOverflow="overflow" vert="horz" wrap="square" lIns="91440" tIns="45721" rIns="91440" bIns="45721" numCol="1" spcCol="0" rtlCol="0" fromWordArt="0" anchor="ctr" anchorCtr="0" forceAA="0" compatLnSpc="1">
-            <a:prstTxWarp prst="textNoShape">
+            </a:prstGeom>
+            <a:noFill/>
+          </p:spPr>
+          <p:txBody>
+            <a:bodyPr wrap="none" rtlCol="0">
+              <a:spAutoFit/>
+            </a:bodyPr>
+            <a:lstStyle/>
+            <a:p>
+              <a:r>
+                <a:rPr lang="en-CA" sz="1801" dirty="0" err="1"/>
+                <a:t>basedOn</a:t>
+              </a:r>
+              <a:endParaRPr lang="en-CA" sz="1801" dirty="0"/>
+            </a:p>
+          </p:txBody>
+        </p:sp>
+        <p:sp>
+          <p:nvSpPr>
+            <p:cNvPr id="15" name="TextBox 14"/>
+            <p:cNvSpPr txBox="1"/>
+            <p:nvPr/>
+          </p:nvSpPr>
+          <p:spPr>
+            <a:xfrm>
+              <a:off x="5509725" y="3757052"/>
+              <a:ext cx="1269002" cy="369460"/>
+            </a:xfrm>
+            <a:prstGeom prst="rect">
               <a:avLst/>
-            </a:prstTxWarp>
-            <a:noAutofit/>
-          </a:bodyPr>
-          <a:lstStyle/>
-          <a:p>
-            <a:pPr algn="ctr"/>
-            <a:r>
-              <a:rPr lang="en-CA" sz="3200" b="1" dirty="0"/>
-              <a:t>Definition</a:t>
-            </a:r>
-          </a:p>
-        </p:txBody>
-      </p:sp>
-      <p:cxnSp>
-        <p:nvCxnSpPr>
-          <p:cNvPr id="103" name="Straight Arrow Connector 102"/>
-          <p:cNvCxnSpPr/>
-          <p:nvPr/>
-        </p:nvCxnSpPr>
-        <p:spPr>
-          <a:xfrm>
-            <a:off x="4074576" y="2706252"/>
-            <a:ext cx="0" cy="376575"/>
-          </a:xfrm>
-          <a:prstGeom prst="straightConnector1">
-            <a:avLst/>
-          </a:prstGeom>
-          <a:ln w="25400">
-            <a:tailEnd type="triangle" w="lg" len="lg"/>
-          </a:ln>
-        </p:spPr>
-        <p:style>
-          <a:lnRef idx="1">
-            <a:schemeClr val="accent1"/>
-          </a:lnRef>
-          <a:fillRef idx="0">
-            <a:schemeClr val="accent1"/>
-          </a:fillRef>
-          <a:effectRef idx="0">
-            <a:schemeClr val="accent1"/>
-          </a:effectRef>
-          <a:fontRef idx="minor">
-            <a:schemeClr val="tx1"/>
-          </a:fontRef>
-        </p:style>
-      </p:cxnSp>
-      <p:cxnSp>
-        <p:nvCxnSpPr>
-          <p:cNvPr id="106" name="Straight Arrow Connector 105"/>
-          <p:cNvCxnSpPr/>
-          <p:nvPr/>
-        </p:nvCxnSpPr>
-        <p:spPr>
-          <a:xfrm>
-            <a:off x="6671171" y="354658"/>
-            <a:ext cx="0" cy="376575"/>
-          </a:xfrm>
-          <a:prstGeom prst="straightConnector1">
-            <a:avLst/>
-          </a:prstGeom>
-          <a:ln w="25400">
-            <a:tailEnd type="triangle" w="lg" len="lg"/>
-          </a:ln>
-        </p:spPr>
-        <p:style>
-          <a:lnRef idx="1">
-            <a:schemeClr val="accent1"/>
-          </a:lnRef>
-          <a:fillRef idx="0">
-            <a:schemeClr val="accent1"/>
-          </a:fillRef>
-          <a:effectRef idx="0">
-            <a:schemeClr val="accent1"/>
-          </a:effectRef>
-          <a:fontRef idx="minor">
-            <a:schemeClr val="tx1"/>
-          </a:fontRef>
-        </p:style>
-      </p:cxnSp>
-      <p:cxnSp>
-        <p:nvCxnSpPr>
-          <p:cNvPr id="79" name="Straight Arrow Connector 78"/>
-          <p:cNvCxnSpPr/>
-          <p:nvPr/>
-        </p:nvCxnSpPr>
-        <p:spPr>
-          <a:xfrm>
-            <a:off x="518407" y="1644806"/>
-            <a:ext cx="469812" cy="0"/>
-          </a:xfrm>
-          <a:prstGeom prst="straightConnector1">
-            <a:avLst/>
-          </a:prstGeom>
-          <a:ln w="25400">
-            <a:tailEnd type="triangle" w="lg" len="lg"/>
-          </a:ln>
-        </p:spPr>
-        <p:style>
-          <a:lnRef idx="1">
-            <a:schemeClr val="accent1"/>
-          </a:lnRef>
-          <a:fillRef idx="0">
-            <a:schemeClr val="accent1"/>
-          </a:fillRef>
-          <a:effectRef idx="0">
-            <a:schemeClr val="accent1"/>
-          </a:effectRef>
-          <a:fontRef idx="minor">
-            <a:schemeClr val="tx1"/>
-          </a:fontRef>
-        </p:style>
-      </p:cxnSp>
-      <p:cxnSp>
-        <p:nvCxnSpPr>
-          <p:cNvPr id="74" name="Straight Arrow Connector 73"/>
-          <p:cNvCxnSpPr/>
-          <p:nvPr/>
-        </p:nvCxnSpPr>
-        <p:spPr>
-          <a:xfrm>
-            <a:off x="2665867" y="354658"/>
-            <a:ext cx="0" cy="376575"/>
-          </a:xfrm>
-          <a:prstGeom prst="straightConnector1">
-            <a:avLst/>
-          </a:prstGeom>
-          <a:ln w="25400">
-            <a:tailEnd type="triangle" w="lg" len="lg"/>
-          </a:ln>
-        </p:spPr>
-        <p:style>
-          <a:lnRef idx="1">
-            <a:schemeClr val="accent1"/>
-          </a:lnRef>
-          <a:fillRef idx="0">
-            <a:schemeClr val="accent1"/>
-          </a:fillRef>
-          <a:effectRef idx="0">
-            <a:schemeClr val="accent1"/>
-          </a:effectRef>
-          <a:fontRef idx="minor">
-            <a:schemeClr val="tx1"/>
-          </a:fontRef>
-        </p:style>
-      </p:cxnSp>
-      <p:cxnSp>
-        <p:nvCxnSpPr>
-          <p:cNvPr id="65" name="Straight Arrow Connector 64"/>
-          <p:cNvCxnSpPr/>
-          <p:nvPr/>
-        </p:nvCxnSpPr>
-        <p:spPr>
-          <a:xfrm>
-            <a:off x="4650606" y="4447165"/>
-            <a:ext cx="0" cy="376575"/>
-          </a:xfrm>
-          <a:prstGeom prst="straightConnector1">
-            <a:avLst/>
-          </a:prstGeom>
-          <a:ln w="25400">
-            <a:headEnd type="triangle" w="lg" len="lg"/>
-            <a:tailEnd type="none" w="lg" len="lg"/>
-          </a:ln>
-        </p:spPr>
-        <p:style>
-          <a:lnRef idx="1">
-            <a:schemeClr val="accent1"/>
-          </a:lnRef>
-          <a:fillRef idx="0">
-            <a:schemeClr val="accent1"/>
-          </a:fillRef>
-          <a:effectRef idx="0">
-            <a:schemeClr val="accent1"/>
-          </a:effectRef>
-          <a:fontRef idx="minor">
-            <a:schemeClr val="tx1"/>
-          </a:fontRef>
-        </p:style>
-      </p:cxnSp>
-      <p:sp>
-        <p:nvSpPr>
-          <p:cNvPr id="27" name="Rectangle 26"/>
-          <p:cNvSpPr/>
-          <p:nvPr/>
-        </p:nvSpPr>
-        <p:spPr>
-          <a:xfrm>
-            <a:off x="4318160" y="2691961"/>
-            <a:ext cx="926072" cy="414966"/>
-          </a:xfrm>
-          <a:prstGeom prst="rect">
-            <a:avLst/>
-          </a:prstGeom>
-          <a:noFill/>
-          <a:ln w="25400">
-            <a:solidFill>
-              <a:srgbClr val="5B9BD5"/>
-            </a:solidFill>
-          </a:ln>
-        </p:spPr>
-        <p:style>
-          <a:lnRef idx="2">
-            <a:schemeClr val="accent1">
-              <a:shade val="50000"/>
-            </a:schemeClr>
-          </a:lnRef>
-          <a:fillRef idx="1">
-            <a:schemeClr val="accent1"/>
-          </a:fillRef>
-          <a:effectRef idx="0">
-            <a:schemeClr val="accent1"/>
-          </a:effectRef>
-          <a:fontRef idx="minor">
-            <a:schemeClr val="lt1"/>
-          </a:fontRef>
-        </p:style>
-        <p:txBody>
-          <a:bodyPr rot="0" spcFirstLastPara="0" vertOverflow="overflow" horzOverflow="overflow" vert="horz" wrap="square" lIns="91440" tIns="45721" rIns="91440" bIns="45721" numCol="1" spcCol="0" rtlCol="0" fromWordArt="0" anchor="ctr" anchorCtr="0" forceAA="0" compatLnSpc="1">
-            <a:prstTxWarp prst="textNoShape">
+            </a:prstGeom>
+            <a:noFill/>
+          </p:spPr>
+          <p:txBody>
+            <a:bodyPr wrap="none" rtlCol="0">
+              <a:spAutoFit/>
+            </a:bodyPr>
+            <a:lstStyle/>
+            <a:p>
+              <a:r>
+                <a:rPr lang="en-CA" sz="1801" dirty="0"/>
+                <a:t>instantiates</a:t>
+              </a:r>
+            </a:p>
+          </p:txBody>
+        </p:sp>
+        <p:sp>
+          <p:nvSpPr>
+            <p:cNvPr id="18" name="TextBox 17"/>
+            <p:cNvSpPr txBox="1"/>
+            <p:nvPr/>
+          </p:nvSpPr>
+          <p:spPr>
+            <a:xfrm>
+              <a:off x="5804983" y="7876"/>
+              <a:ext cx="797013" cy="369460"/>
+            </a:xfrm>
+            <a:prstGeom prst="rect">
               <a:avLst/>
-            </a:prstTxWarp>
-            <a:noAutofit/>
-          </a:bodyPr>
-          <a:lstStyle/>
-          <a:p>
-            <a:pPr algn="ctr"/>
-            <a:endParaRPr lang="en-CA" sz="1801"/>
-          </a:p>
-        </p:txBody>
-      </p:sp>
-      <p:sp>
-        <p:nvSpPr>
-          <p:cNvPr id="29" name="TextBox 28"/>
-          <p:cNvSpPr txBox="1"/>
-          <p:nvPr/>
-        </p:nvSpPr>
-        <p:spPr>
-          <a:xfrm>
-            <a:off x="4298435" y="2372530"/>
-            <a:ext cx="965521" cy="369460"/>
-          </a:xfrm>
-          <a:prstGeom prst="rect">
-            <a:avLst/>
-          </a:prstGeom>
-          <a:noFill/>
-        </p:spPr>
-        <p:txBody>
-          <a:bodyPr wrap="none" rtlCol="0">
-            <a:spAutoFit/>
-          </a:bodyPr>
-          <a:lstStyle/>
-          <a:p>
-            <a:r>
-              <a:rPr lang="en-CA" sz="1801" dirty="0"/>
-              <a:t>replaces</a:t>
-            </a:r>
-          </a:p>
-        </p:txBody>
-      </p:sp>
+            </a:prstGeom>
+            <a:noFill/>
+          </p:spPr>
+          <p:txBody>
+            <a:bodyPr wrap="none" rtlCol="0">
+              <a:spAutoFit/>
+            </a:bodyPr>
+            <a:lstStyle/>
+            <a:p>
+              <a:r>
+                <a:rPr lang="en-CA" sz="1801" dirty="0" err="1"/>
+                <a:t>partOf</a:t>
+              </a:r>
+              <a:endParaRPr lang="en-CA" sz="1801" dirty="0"/>
+            </a:p>
+          </p:txBody>
+        </p:sp>
+        <p:sp>
+          <p:nvSpPr>
+            <p:cNvPr id="19" name="TextBox 18"/>
+            <p:cNvSpPr txBox="1"/>
+            <p:nvPr/>
+          </p:nvSpPr>
+          <p:spPr>
+            <a:xfrm>
+              <a:off x="9295" y="852684"/>
+              <a:ext cx="1018227" cy="369460"/>
+            </a:xfrm>
+            <a:prstGeom prst="rect">
+              <a:avLst/>
+            </a:prstGeom>
+            <a:noFill/>
+          </p:spPr>
+          <p:txBody>
+            <a:bodyPr wrap="none" rtlCol="0">
+              <a:spAutoFit/>
+            </a:bodyPr>
+            <a:lstStyle/>
+            <a:p>
+              <a:r>
+                <a:rPr lang="en-CA" sz="1801" dirty="0" err="1"/>
+                <a:t>basedOn</a:t>
+              </a:r>
+              <a:endParaRPr lang="en-CA" sz="1801" dirty="0"/>
+            </a:p>
+          </p:txBody>
+        </p:sp>
+        <p:sp>
+          <p:nvSpPr>
+            <p:cNvPr id="20" name="TextBox 19"/>
+            <p:cNvSpPr txBox="1"/>
+            <p:nvPr/>
+          </p:nvSpPr>
+          <p:spPr>
+            <a:xfrm>
+              <a:off x="1668690" y="3757052"/>
+              <a:ext cx="1269002" cy="369460"/>
+            </a:xfrm>
+            <a:prstGeom prst="rect">
+              <a:avLst/>
+            </a:prstGeom>
+            <a:noFill/>
+          </p:spPr>
+          <p:txBody>
+            <a:bodyPr wrap="none" rtlCol="0">
+              <a:spAutoFit/>
+            </a:bodyPr>
+            <a:lstStyle/>
+            <a:p>
+              <a:r>
+                <a:rPr lang="en-CA" sz="1801" dirty="0"/>
+                <a:t>instantiates</a:t>
+              </a:r>
+            </a:p>
+          </p:txBody>
+        </p:sp>
+        <p:sp>
+          <p:nvSpPr>
+            <p:cNvPr id="21" name="TextBox 20"/>
+            <p:cNvSpPr txBox="1"/>
+            <p:nvPr/>
+          </p:nvSpPr>
+          <p:spPr>
+            <a:xfrm>
+              <a:off x="1721155" y="9480"/>
+              <a:ext cx="965521" cy="369460"/>
+            </a:xfrm>
+            <a:prstGeom prst="rect">
+              <a:avLst/>
+            </a:prstGeom>
+            <a:noFill/>
+          </p:spPr>
+          <p:txBody>
+            <a:bodyPr wrap="none" rtlCol="0">
+              <a:spAutoFit/>
+            </a:bodyPr>
+            <a:lstStyle/>
+            <a:p>
+              <a:r>
+                <a:rPr lang="en-CA" sz="1801" dirty="0"/>
+                <a:t>replaces</a:t>
+              </a:r>
+            </a:p>
+          </p:txBody>
+        </p:sp>
+        <p:sp>
+          <p:nvSpPr>
+            <p:cNvPr id="22" name="TextBox 21"/>
+            <p:cNvSpPr txBox="1"/>
+            <p:nvPr/>
+          </p:nvSpPr>
+          <p:spPr>
+            <a:xfrm>
+              <a:off x="3641811" y="4791397"/>
+              <a:ext cx="1091517" cy="369460"/>
+            </a:xfrm>
+            <a:prstGeom prst="rect">
+              <a:avLst/>
+            </a:prstGeom>
+            <a:noFill/>
+          </p:spPr>
+          <p:txBody>
+            <a:bodyPr wrap="none" rtlCol="0">
+              <a:spAutoFit/>
+            </a:bodyPr>
+            <a:lstStyle/>
+            <a:p>
+              <a:r>
+                <a:rPr lang="en-CA" sz="1801" dirty="0"/>
+                <a:t>definition</a:t>
+              </a:r>
+            </a:p>
+          </p:txBody>
+        </p:sp>
+        <p:sp>
+          <p:nvSpPr>
+            <p:cNvPr id="23" name="TextBox 22"/>
+            <p:cNvSpPr txBox="1"/>
+            <p:nvPr/>
+          </p:nvSpPr>
+          <p:spPr>
+            <a:xfrm>
+              <a:off x="3208284" y="2384709"/>
+              <a:ext cx="797013" cy="369460"/>
+            </a:xfrm>
+            <a:prstGeom prst="rect">
+              <a:avLst/>
+            </a:prstGeom>
+            <a:noFill/>
+          </p:spPr>
+          <p:txBody>
+            <a:bodyPr wrap="none" rtlCol="0">
+              <a:spAutoFit/>
+            </a:bodyPr>
+            <a:lstStyle/>
+            <a:p>
+              <a:r>
+                <a:rPr lang="en-CA" sz="1801" dirty="0" err="1"/>
+                <a:t>partOf</a:t>
+              </a:r>
+              <a:endParaRPr lang="en-CA" sz="1801" dirty="0"/>
+            </a:p>
+          </p:txBody>
+        </p:sp>
+        <p:cxnSp>
+          <p:nvCxnSpPr>
+            <p:cNvPr id="32" name="Connector: Elbow 31"/>
+            <p:cNvCxnSpPr>
+              <a:endCxn id="4" idx="3"/>
+            </p:cNvCxnSpPr>
+            <p:nvPr/>
+          </p:nvCxnSpPr>
+          <p:spPr>
+            <a:xfrm rot="10800000">
+              <a:off x="3464723" y="1406435"/>
+              <a:ext cx="1917035" cy="2971"/>
+            </a:xfrm>
+            <a:prstGeom prst="bentConnector3">
+              <a:avLst>
+                <a:gd name="adj1" fmla="val 50000"/>
+              </a:avLst>
+            </a:prstGeom>
+            <a:ln w="25400">
+              <a:tailEnd type="triangle" w="lg" len="lg"/>
+            </a:ln>
+          </p:spPr>
+          <p:style>
+            <a:lnRef idx="1">
+              <a:schemeClr val="accent1"/>
+            </a:lnRef>
+            <a:fillRef idx="0">
+              <a:schemeClr val="accent1"/>
+            </a:fillRef>
+            <a:effectRef idx="0">
+              <a:schemeClr val="accent1"/>
+            </a:effectRef>
+            <a:fontRef idx="minor">
+              <a:schemeClr val="tx1"/>
+            </a:fontRef>
+          </p:style>
+        </p:cxnSp>
+        <p:sp>
+          <p:nvSpPr>
+            <p:cNvPr id="37" name="Rectangle: Rounded Corners 36"/>
+            <p:cNvSpPr/>
+            <p:nvPr/>
+          </p:nvSpPr>
+          <p:spPr>
+            <a:xfrm>
+              <a:off x="4912587" y="716477"/>
+              <a:ext cx="2493818" cy="1379912"/>
+            </a:xfrm>
+            <a:prstGeom prst="roundRect">
+              <a:avLst/>
+            </a:prstGeom>
+          </p:spPr>
+          <p:style>
+            <a:lnRef idx="2">
+              <a:schemeClr val="accent1">
+                <a:shade val="50000"/>
+              </a:schemeClr>
+            </a:lnRef>
+            <a:fillRef idx="1">
+              <a:schemeClr val="accent1"/>
+            </a:fillRef>
+            <a:effectRef idx="0">
+              <a:schemeClr val="accent1"/>
+            </a:effectRef>
+            <a:fontRef idx="minor">
+              <a:schemeClr val="lt1"/>
+            </a:fontRef>
+          </p:style>
+          <p:txBody>
+            <a:bodyPr rot="0" spcFirstLastPara="0" vertOverflow="overflow" horzOverflow="overflow" vert="horz" wrap="square" lIns="91440" tIns="45721" rIns="91440" bIns="45721" numCol="1" spcCol="0" rtlCol="0" fromWordArt="0" anchor="ctr" anchorCtr="0" forceAA="0" compatLnSpc="1">
+              <a:prstTxWarp prst="textNoShape">
+                <a:avLst/>
+              </a:prstTxWarp>
+              <a:noAutofit/>
+            </a:bodyPr>
+            <a:lstStyle/>
+            <a:p>
+              <a:pPr algn="ctr"/>
+              <a:r>
+                <a:rPr lang="en-CA" sz="3200" b="1" dirty="0"/>
+                <a:t>Event</a:t>
+              </a:r>
+            </a:p>
+          </p:txBody>
+        </p:sp>
+        <p:cxnSp>
+          <p:nvCxnSpPr>
+            <p:cNvPr id="40" name="Connector: Elbow 39"/>
+            <p:cNvCxnSpPr>
+              <a:stCxn id="37" idx="2"/>
+              <a:endCxn id="5" idx="3"/>
+            </p:cNvCxnSpPr>
+            <p:nvPr/>
+          </p:nvCxnSpPr>
+          <p:spPr>
+            <a:xfrm rot="5400000">
+              <a:off x="4959335" y="2572621"/>
+              <a:ext cx="1676395" cy="723935"/>
+            </a:xfrm>
+            <a:prstGeom prst="bentConnector2">
+              <a:avLst/>
+            </a:prstGeom>
+            <a:ln w="25400">
+              <a:tailEnd type="triangle" w="lg" len="lg"/>
+            </a:ln>
+          </p:spPr>
+          <p:style>
+            <a:lnRef idx="1">
+              <a:schemeClr val="accent1"/>
+            </a:lnRef>
+            <a:fillRef idx="0">
+              <a:schemeClr val="accent1"/>
+            </a:fillRef>
+            <a:effectRef idx="0">
+              <a:schemeClr val="accent1"/>
+            </a:effectRef>
+            <a:fontRef idx="minor">
+              <a:schemeClr val="tx1"/>
+            </a:fontRef>
+          </p:style>
+        </p:cxnSp>
+        <p:cxnSp>
+          <p:nvCxnSpPr>
+            <p:cNvPr id="66" name="Straight Connector 65"/>
+            <p:cNvCxnSpPr/>
+            <p:nvPr/>
+          </p:nvCxnSpPr>
+          <p:spPr>
+            <a:xfrm>
+              <a:off x="3724534" y="4468120"/>
+              <a:ext cx="0" cy="376575"/>
+            </a:xfrm>
+            <a:prstGeom prst="line">
+              <a:avLst/>
+            </a:prstGeom>
+            <a:ln w="25400"/>
+          </p:spPr>
+          <p:style>
+            <a:lnRef idx="1">
+              <a:schemeClr val="accent1"/>
+            </a:lnRef>
+            <a:fillRef idx="0">
+              <a:schemeClr val="accent1"/>
+            </a:fillRef>
+            <a:effectRef idx="0">
+              <a:schemeClr val="accent1"/>
+            </a:effectRef>
+            <a:fontRef idx="minor">
+              <a:schemeClr val="tx1"/>
+            </a:fontRef>
+          </p:style>
+        </p:cxnSp>
+        <p:sp>
+          <p:nvSpPr>
+            <p:cNvPr id="102" name="Rectangle 101"/>
+            <p:cNvSpPr/>
+            <p:nvPr/>
+          </p:nvSpPr>
+          <p:spPr>
+            <a:xfrm>
+              <a:off x="3143755" y="2683826"/>
+              <a:ext cx="926072" cy="414966"/>
+            </a:xfrm>
+            <a:prstGeom prst="rect">
+              <a:avLst/>
+            </a:prstGeom>
+            <a:noFill/>
+            <a:ln w="25400">
+              <a:solidFill>
+                <a:srgbClr val="5B9BD5"/>
+              </a:solidFill>
+            </a:ln>
+          </p:spPr>
+          <p:style>
+            <a:lnRef idx="2">
+              <a:schemeClr val="accent1">
+                <a:shade val="50000"/>
+              </a:schemeClr>
+            </a:lnRef>
+            <a:fillRef idx="1">
+              <a:schemeClr val="accent1"/>
+            </a:fillRef>
+            <a:effectRef idx="0">
+              <a:schemeClr val="accent1"/>
+            </a:effectRef>
+            <a:fontRef idx="minor">
+              <a:schemeClr val="lt1"/>
+            </a:fontRef>
+          </p:style>
+          <p:txBody>
+            <a:bodyPr rot="0" spcFirstLastPara="0" vertOverflow="overflow" horzOverflow="overflow" vert="horz" wrap="square" lIns="91440" tIns="45721" rIns="91440" bIns="45721" numCol="1" spcCol="0" rtlCol="0" fromWordArt="0" anchor="ctr" anchorCtr="0" forceAA="0" compatLnSpc="1">
+              <a:prstTxWarp prst="textNoShape">
+                <a:avLst/>
+              </a:prstTxWarp>
+              <a:noAutofit/>
+            </a:bodyPr>
+            <a:lstStyle/>
+            <a:p>
+              <a:pPr algn="ctr"/>
+              <a:endParaRPr lang="en-CA" sz="1801"/>
+            </a:p>
+          </p:txBody>
+        </p:sp>
+        <p:sp>
+          <p:nvSpPr>
+            <p:cNvPr id="5" name="Rectangle: Rounded Corners 4"/>
+            <p:cNvSpPr/>
+            <p:nvPr/>
+          </p:nvSpPr>
+          <p:spPr>
+            <a:xfrm>
+              <a:off x="2941743" y="3082827"/>
+              <a:ext cx="2493818" cy="1379912"/>
+            </a:xfrm>
+            <a:prstGeom prst="roundRect">
+              <a:avLst/>
+            </a:prstGeom>
+          </p:spPr>
+          <p:style>
+            <a:lnRef idx="2">
+              <a:schemeClr val="accent1">
+                <a:shade val="50000"/>
+              </a:schemeClr>
+            </a:lnRef>
+            <a:fillRef idx="1">
+              <a:schemeClr val="accent1"/>
+            </a:fillRef>
+            <a:effectRef idx="0">
+              <a:schemeClr val="accent1"/>
+            </a:effectRef>
+            <a:fontRef idx="minor">
+              <a:schemeClr val="lt1"/>
+            </a:fontRef>
+          </p:style>
+          <p:txBody>
+            <a:bodyPr rot="0" spcFirstLastPara="0" vertOverflow="overflow" horzOverflow="overflow" vert="horz" wrap="square" lIns="91440" tIns="45721" rIns="91440" bIns="45721" numCol="1" spcCol="0" rtlCol="0" fromWordArt="0" anchor="ctr" anchorCtr="0" forceAA="0" compatLnSpc="1">
+              <a:prstTxWarp prst="textNoShape">
+                <a:avLst/>
+              </a:prstTxWarp>
+              <a:noAutofit/>
+            </a:bodyPr>
+            <a:lstStyle/>
+            <a:p>
+              <a:pPr algn="ctr"/>
+              <a:r>
+                <a:rPr lang="en-CA" sz="3200" b="1" dirty="0"/>
+                <a:t>Definition</a:t>
+              </a:r>
+            </a:p>
+          </p:txBody>
+        </p:sp>
+        <p:cxnSp>
+          <p:nvCxnSpPr>
+            <p:cNvPr id="103" name="Straight Arrow Connector 102"/>
+            <p:cNvCxnSpPr/>
+            <p:nvPr/>
+          </p:nvCxnSpPr>
+          <p:spPr>
+            <a:xfrm>
+              <a:off x="4068226" y="2706252"/>
+              <a:ext cx="0" cy="376575"/>
+            </a:xfrm>
+            <a:prstGeom prst="straightConnector1">
+              <a:avLst/>
+            </a:prstGeom>
+            <a:ln w="25400">
+              <a:tailEnd type="triangle" w="lg" len="lg"/>
+            </a:ln>
+          </p:spPr>
+          <p:style>
+            <a:lnRef idx="1">
+              <a:schemeClr val="accent1"/>
+            </a:lnRef>
+            <a:fillRef idx="0">
+              <a:schemeClr val="accent1"/>
+            </a:fillRef>
+            <a:effectRef idx="0">
+              <a:schemeClr val="accent1"/>
+            </a:effectRef>
+            <a:fontRef idx="minor">
+              <a:schemeClr val="tx1"/>
+            </a:fontRef>
+          </p:style>
+        </p:cxnSp>
+        <p:cxnSp>
+          <p:nvCxnSpPr>
+            <p:cNvPr id="106" name="Straight Arrow Connector 105"/>
+            <p:cNvCxnSpPr/>
+            <p:nvPr/>
+          </p:nvCxnSpPr>
+          <p:spPr>
+            <a:xfrm>
+              <a:off x="6671171" y="354658"/>
+              <a:ext cx="0" cy="376575"/>
+            </a:xfrm>
+            <a:prstGeom prst="straightConnector1">
+              <a:avLst/>
+            </a:prstGeom>
+            <a:ln w="25400">
+              <a:tailEnd type="triangle" w="lg" len="lg"/>
+            </a:ln>
+          </p:spPr>
+          <p:style>
+            <a:lnRef idx="1">
+              <a:schemeClr val="accent1"/>
+            </a:lnRef>
+            <a:fillRef idx="0">
+              <a:schemeClr val="accent1"/>
+            </a:fillRef>
+            <a:effectRef idx="0">
+              <a:schemeClr val="accent1"/>
+            </a:effectRef>
+            <a:fontRef idx="minor">
+              <a:schemeClr val="tx1"/>
+            </a:fontRef>
+          </p:style>
+        </p:cxnSp>
+        <p:cxnSp>
+          <p:nvCxnSpPr>
+            <p:cNvPr id="79" name="Straight Arrow Connector 78"/>
+            <p:cNvCxnSpPr/>
+            <p:nvPr/>
+          </p:nvCxnSpPr>
+          <p:spPr>
+            <a:xfrm>
+              <a:off x="518407" y="1644806"/>
+              <a:ext cx="469812" cy="0"/>
+            </a:xfrm>
+            <a:prstGeom prst="straightConnector1">
+              <a:avLst/>
+            </a:prstGeom>
+            <a:ln w="25400">
+              <a:tailEnd type="triangle" w="lg" len="lg"/>
+            </a:ln>
+          </p:spPr>
+          <p:style>
+            <a:lnRef idx="1">
+              <a:schemeClr val="accent1"/>
+            </a:lnRef>
+            <a:fillRef idx="0">
+              <a:schemeClr val="accent1"/>
+            </a:fillRef>
+            <a:effectRef idx="0">
+              <a:schemeClr val="accent1"/>
+            </a:effectRef>
+            <a:fontRef idx="minor">
+              <a:schemeClr val="tx1"/>
+            </a:fontRef>
+          </p:style>
+        </p:cxnSp>
+        <p:cxnSp>
+          <p:nvCxnSpPr>
+            <p:cNvPr id="74" name="Straight Arrow Connector 73"/>
+            <p:cNvCxnSpPr/>
+            <p:nvPr/>
+          </p:nvCxnSpPr>
+          <p:spPr>
+            <a:xfrm>
+              <a:off x="2665867" y="354658"/>
+              <a:ext cx="0" cy="376575"/>
+            </a:xfrm>
+            <a:prstGeom prst="straightConnector1">
+              <a:avLst/>
+            </a:prstGeom>
+            <a:ln w="25400">
+              <a:tailEnd type="triangle" w="lg" len="lg"/>
+            </a:ln>
+          </p:spPr>
+          <p:style>
+            <a:lnRef idx="1">
+              <a:schemeClr val="accent1"/>
+            </a:lnRef>
+            <a:fillRef idx="0">
+              <a:schemeClr val="accent1"/>
+            </a:fillRef>
+            <a:effectRef idx="0">
+              <a:schemeClr val="accent1"/>
+            </a:effectRef>
+            <a:fontRef idx="minor">
+              <a:schemeClr val="tx1"/>
+            </a:fontRef>
+          </p:style>
+        </p:cxnSp>
+        <p:cxnSp>
+          <p:nvCxnSpPr>
+            <p:cNvPr id="65" name="Straight Arrow Connector 64"/>
+            <p:cNvCxnSpPr/>
+            <p:nvPr/>
+          </p:nvCxnSpPr>
+          <p:spPr>
+            <a:xfrm>
+              <a:off x="4650606" y="4447165"/>
+              <a:ext cx="0" cy="376575"/>
+            </a:xfrm>
+            <a:prstGeom prst="straightConnector1">
+              <a:avLst/>
+            </a:prstGeom>
+            <a:ln w="25400">
+              <a:headEnd type="triangle" w="lg" len="lg"/>
+              <a:tailEnd type="none" w="lg" len="lg"/>
+            </a:ln>
+          </p:spPr>
+          <p:style>
+            <a:lnRef idx="1">
+              <a:schemeClr val="accent1"/>
+            </a:lnRef>
+            <a:fillRef idx="0">
+              <a:schemeClr val="accent1"/>
+            </a:fillRef>
+            <a:effectRef idx="0">
+              <a:schemeClr val="accent1"/>
+            </a:effectRef>
+            <a:fontRef idx="minor">
+              <a:schemeClr val="tx1"/>
+            </a:fontRef>
+          </p:style>
+        </p:cxnSp>
+        <p:sp>
+          <p:nvSpPr>
+            <p:cNvPr id="27" name="Rectangle 26"/>
+            <p:cNvSpPr/>
+            <p:nvPr/>
+          </p:nvSpPr>
+          <p:spPr>
+            <a:xfrm>
+              <a:off x="4318160" y="2691961"/>
+              <a:ext cx="926072" cy="414966"/>
+            </a:xfrm>
+            <a:prstGeom prst="rect">
+              <a:avLst/>
+            </a:prstGeom>
+            <a:noFill/>
+            <a:ln w="25400">
+              <a:solidFill>
+                <a:srgbClr val="5B9BD5"/>
+              </a:solidFill>
+            </a:ln>
+          </p:spPr>
+          <p:style>
+            <a:lnRef idx="2">
+              <a:schemeClr val="accent1">
+                <a:shade val="50000"/>
+              </a:schemeClr>
+            </a:lnRef>
+            <a:fillRef idx="1">
+              <a:schemeClr val="accent1"/>
+            </a:fillRef>
+            <a:effectRef idx="0">
+              <a:schemeClr val="accent1"/>
+            </a:effectRef>
+            <a:fontRef idx="minor">
+              <a:schemeClr val="lt1"/>
+            </a:fontRef>
+          </p:style>
+          <p:txBody>
+            <a:bodyPr rot="0" spcFirstLastPara="0" vertOverflow="overflow" horzOverflow="overflow" vert="horz" wrap="square" lIns="91440" tIns="45721" rIns="91440" bIns="45721" numCol="1" spcCol="0" rtlCol="0" fromWordArt="0" anchor="ctr" anchorCtr="0" forceAA="0" compatLnSpc="1">
+              <a:prstTxWarp prst="textNoShape">
+                <a:avLst/>
+              </a:prstTxWarp>
+              <a:noAutofit/>
+            </a:bodyPr>
+            <a:lstStyle/>
+            <a:p>
+              <a:pPr algn="ctr"/>
+              <a:endParaRPr lang="en-CA" sz="1801"/>
+            </a:p>
+          </p:txBody>
+        </p:sp>
+        <p:sp>
+          <p:nvSpPr>
+            <p:cNvPr id="29" name="TextBox 28"/>
+            <p:cNvSpPr txBox="1"/>
+            <p:nvPr/>
+          </p:nvSpPr>
+          <p:spPr>
+            <a:xfrm>
+              <a:off x="4298435" y="2372530"/>
+              <a:ext cx="965521" cy="369460"/>
+            </a:xfrm>
+            <a:prstGeom prst="rect">
+              <a:avLst/>
+            </a:prstGeom>
+            <a:noFill/>
+          </p:spPr>
+          <p:txBody>
+            <a:bodyPr wrap="none" rtlCol="0">
+              <a:spAutoFit/>
+            </a:bodyPr>
+            <a:lstStyle/>
+            <a:p>
+              <a:r>
+                <a:rPr lang="en-CA" sz="1801" dirty="0"/>
+                <a:t>replaces</a:t>
+              </a:r>
+            </a:p>
+          </p:txBody>
+        </p:sp>
+        <p:cxnSp>
+          <p:nvCxnSpPr>
+            <p:cNvPr id="30" name="Straight Arrow Connector 29">
+              <a:extLst>
+                <a:ext uri="{FF2B5EF4-FFF2-40B4-BE49-F238E27FC236}">
+                  <a16:creationId xmlns:a16="http://schemas.microsoft.com/office/drawing/2014/main" id="{D71CBE15-549B-4C0D-B352-9F2E8C7BBC4B}"/>
+                </a:ext>
+              </a:extLst>
+            </p:cNvPr>
+            <p:cNvCxnSpPr/>
+            <p:nvPr/>
+          </p:nvCxnSpPr>
+          <p:spPr>
+            <a:xfrm>
+              <a:off x="4315876" y="2706252"/>
+              <a:ext cx="0" cy="376575"/>
+            </a:xfrm>
+            <a:prstGeom prst="straightConnector1">
+              <a:avLst/>
+            </a:prstGeom>
+            <a:ln w="25400">
+              <a:tailEnd type="triangle" w="lg" len="lg"/>
+            </a:ln>
+          </p:spPr>
+          <p:style>
+            <a:lnRef idx="1">
+              <a:schemeClr val="accent1"/>
+            </a:lnRef>
+            <a:fillRef idx="0">
+              <a:schemeClr val="accent1"/>
+            </a:fillRef>
+            <a:effectRef idx="0">
+              <a:schemeClr val="accent1"/>
+            </a:effectRef>
+            <a:fontRef idx="minor">
+              <a:schemeClr val="tx1"/>
+            </a:fontRef>
+          </p:style>
+        </p:cxnSp>
+      </p:grpSp>
     </p:spTree>
     <p:extLst>
       <p:ext uri="{BB962C8B-B14F-4D97-AF65-F5344CB8AC3E}">

</xml_diff>